<commit_message>
Mise à jour 2023
</commit_message>
<xml_diff>
--- a/coursIntro.pptx
+++ b/coursIntro.pptx
@@ -367,7 +367,7 @@
             </a:pPr>
             <a:fld id="{870BBE49-FCCB-4A90-A45C-67088542EE9F}" type="datetime1">
               <a:rPr lang="fr-FR" smtClean="0"/>
-              <a:t>08/09/2022</a:t>
+              <a:t>12/09/2023</a:t>
             </a:fld>
             <a:endParaRPr lang="fr-FR"/>
           </a:p>
@@ -602,7 +602,7 @@
             </a:pPr>
             <a:fld id="{B3571AEC-2BC4-4B6C-B79E-00D12817ECD9}" type="datetime1">
               <a:rPr lang="fr-FR" smtClean="0"/>
-              <a:t>08/09/2022</a:t>
+              <a:t>12/09/2023</a:t>
             </a:fld>
             <a:endParaRPr lang="fr-FR"/>
           </a:p>
@@ -1144,7 +1144,7 @@
             </a:pPr>
             <a:fld id="{046FFCB7-D57F-4C8C-BA32-2BA73F4500C6}" type="datetime1">
               <a:rPr lang="fr-FR" smtClean="0"/>
-              <a:t>08/09/2022</a:t>
+              <a:t>12/09/2023</a:t>
             </a:fld>
             <a:endParaRPr lang="fr-FR"/>
           </a:p>
@@ -1436,7 +1436,7 @@
             </a:pPr>
             <a:fld id="{CA852A4D-1BFF-498F-B63C-A36E50EC025B}" type="datetime1">
               <a:rPr lang="fr-FR" smtClean="0"/>
-              <a:t>08/09/2022</a:t>
+              <a:t>12/09/2023</a:t>
             </a:fld>
             <a:endParaRPr lang="fr-FR"/>
           </a:p>
@@ -2028,8 +2028,8 @@
               <a:rPr lang="fr-FR" altLang="fr-FR" dirty="0"/>
             </a:br>
             <a:r>
-              <a:rPr lang="fr-FR" altLang="fr-FR" dirty="0"/>
-              <a:t>Septembre 2022</a:t>
+              <a:rPr lang="fr-FR" altLang="fr-FR"/>
+              <a:t>Septembre 2023</a:t>
             </a:r>
             <a:br>
               <a:rPr lang="fr-FR" altLang="fr-FR" dirty="0"/>
@@ -2506,7 +2506,7 @@
           <a:p>
             <a:r>
               <a:rPr lang="fr-FR" dirty="0"/>
-              <a:t>Uniquement du TD (2 groupes)</a:t>
+              <a:t>Uniquement du TD (1 ou 2 groupes)</a:t>
             </a:r>
           </a:p>
           <a:p>
@@ -2929,7 +2929,7 @@
           <p:nvPr>
             <p:extLst>
               <p:ext uri="{D42A27DB-BD31-4B8C-83A1-F6EECF244321}">
-                <p14:modId xmlns:p14="http://schemas.microsoft.com/office/powerpoint/2010/main" val="2444075601"/>
+                <p14:modId xmlns:p14="http://schemas.microsoft.com/office/powerpoint/2010/main" val="943420979"/>
               </p:ext>
             </p:extLst>
           </p:nvPr>
@@ -3205,11 +3205,11 @@
                     <a:p>
                       <a:pPr algn="l"/>
                       <a:r>
-                        <a:rPr lang="fr-FR" sz="1700">
+                        <a:rPr lang="fr-FR" sz="1700" dirty="0">
                           <a:effectLst/>
                           <a:latin typeface="Liberation Sans" panose="020B0604020202020204" pitchFamily="34" charset="0"/>
                         </a:rPr>
-                        <a:t>19/09/22</a:t>
+                        <a:t>18/9</a:t>
                       </a:r>
                     </a:p>
                   </a:txBody>
@@ -3390,11 +3390,11 @@
                     <a:p>
                       <a:pPr algn="l"/>
                       <a:r>
-                        <a:rPr lang="fr-FR" sz="1700">
+                        <a:rPr lang="fr-FR" sz="1700" dirty="0">
                           <a:effectLst/>
                           <a:latin typeface="Liberation Sans" panose="020B0604020202020204" pitchFamily="34" charset="0"/>
                         </a:rPr>
-                        <a:t>26/09/22</a:t>
+                        <a:t>25/9</a:t>
                       </a:r>
                     </a:p>
                   </a:txBody>
@@ -3575,11 +3575,11 @@
                     <a:p>
                       <a:pPr algn="l"/>
                       <a:r>
-                        <a:rPr lang="fr-FR" sz="1700">
+                        <a:rPr lang="fr-FR" sz="1700" dirty="0">
                           <a:effectLst/>
                           <a:latin typeface="Liberation Sans" panose="020B0604020202020204" pitchFamily="34" charset="0"/>
                         </a:rPr>
-                        <a:t>03/10/22</a:t>
+                        <a:t>2/10</a:t>
                       </a:r>
                     </a:p>
                   </a:txBody>
@@ -3744,11 +3744,11 @@
                     <a:p>
                       <a:pPr algn="l"/>
                       <a:r>
-                        <a:rPr lang="fr-FR" sz="1700">
+                        <a:rPr lang="fr-FR" sz="1700" dirty="0">
                           <a:effectLst/>
                           <a:latin typeface="Liberation Sans" panose="020B0604020202020204" pitchFamily="34" charset="0"/>
                         </a:rPr>
-                        <a:t>10/10/22</a:t>
+                        <a:t>9/10</a:t>
                       </a:r>
                     </a:p>
                   </a:txBody>
@@ -3913,11 +3913,11 @@
                     <a:p>
                       <a:pPr algn="l"/>
                       <a:r>
-                        <a:rPr lang="fr-FR" sz="1700">
+                        <a:rPr lang="fr-FR" sz="1700" dirty="0">
                           <a:effectLst/>
                           <a:latin typeface="Liberation Sans" panose="020B0604020202020204" pitchFamily="34" charset="0"/>
                         </a:rPr>
-                        <a:t>17/10/22</a:t>
+                        <a:t>16/10</a:t>
                       </a:r>
                     </a:p>
                   </a:txBody>
@@ -4082,11 +4082,11 @@
                     <a:p>
                       <a:pPr algn="l"/>
                       <a:r>
-                        <a:rPr lang="fr-FR" sz="1700">
+                        <a:rPr lang="fr-FR" sz="1700" dirty="0">
                           <a:effectLst/>
                           <a:latin typeface="Liberation Sans" panose="020B0604020202020204" pitchFamily="34" charset="0"/>
                         </a:rPr>
-                        <a:t>24/10/22</a:t>
+                        <a:t>23/10</a:t>
                       </a:r>
                     </a:p>
                   </a:txBody>
@@ -4200,7 +4200,7 @@
                     <a:p>
                       <a:pPr algn="l"/>
                       <a:r>
-                        <a:rPr lang="fr-FR" sz="1700">
+                        <a:rPr lang="fr-FR" sz="1700" dirty="0">
                           <a:effectLst/>
                           <a:latin typeface="Liberation Sans" panose="020B0604020202020204" pitchFamily="34" charset="0"/>
                         </a:rPr>
@@ -4254,11 +4254,11 @@
                     <a:p>
                       <a:pPr algn="l"/>
                       <a:r>
-                        <a:rPr lang="fr-FR" sz="1700">
+                        <a:rPr lang="fr-FR" sz="1700" dirty="0">
                           <a:effectLst/>
                           <a:latin typeface="Liberation Sans" panose="020B0604020202020204" pitchFamily="34" charset="0"/>
                         </a:rPr>
-                        <a:t>07/11/22</a:t>
+                        <a:t>6/11</a:t>
                       </a:r>
                     </a:p>
                   </a:txBody>
@@ -4385,65 +4385,11 @@
                     <a:p>
                       <a:pPr algn="l"/>
                       <a:r>
-                        <a:rPr lang="fr-FR" sz="1700">
+                        <a:rPr lang="fr-FR" sz="1700" dirty="0">
                           <a:effectLst/>
                           <a:latin typeface="Liberation Sans" panose="020B0604020202020204" pitchFamily="34" charset="0"/>
                         </a:rPr>
                         <a:t>8</a:t>
-                      </a:r>
-                    </a:p>
-                  </a:txBody>
-                  <a:tcPr marL="87038" marR="87038" marT="43519" marB="43519" anchor="ctr">
-                    <a:lnL w="7620" cap="flat" cmpd="sng" algn="ctr">
-                      <a:solidFill>
-                        <a:srgbClr val="000000"/>
-                      </a:solidFill>
-                      <a:prstDash val="solid"/>
-                      <a:round/>
-                      <a:headEnd type="none" w="med" len="med"/>
-                      <a:tailEnd type="none" w="med" len="med"/>
-                    </a:lnL>
-                    <a:lnR w="7620" cap="flat" cmpd="sng" algn="ctr">
-                      <a:solidFill>
-                        <a:srgbClr val="000000"/>
-                      </a:solidFill>
-                      <a:prstDash val="solid"/>
-                      <a:round/>
-                      <a:headEnd type="none" w="med" len="med"/>
-                      <a:tailEnd type="none" w="med" len="med"/>
-                    </a:lnR>
-                    <a:lnT w="7620" cap="flat" cmpd="sng" algn="ctr">
-                      <a:solidFill>
-                        <a:srgbClr val="000000"/>
-                      </a:solidFill>
-                      <a:prstDash val="solid"/>
-                      <a:round/>
-                      <a:headEnd type="none" w="med" len="med"/>
-                      <a:tailEnd type="none" w="med" len="med"/>
-                    </a:lnT>
-                    <a:lnB w="7620" cap="flat" cmpd="sng" algn="ctr">
-                      <a:solidFill>
-                        <a:srgbClr val="000000"/>
-                      </a:solidFill>
-                      <a:prstDash val="solid"/>
-                      <a:round/>
-                      <a:headEnd type="none" w="med" len="med"/>
-                      <a:tailEnd type="none" w="med" len="med"/>
-                    </a:lnB>
-                  </a:tcPr>
-                </a:tc>
-                <a:tc>
-                  <a:txBody>
-                    <a:bodyPr/>
-                    <a:lstStyle/>
-                    <a:p>
-                      <a:pPr algn="l"/>
-                      <a:r>
-                        <a:rPr lang="fr-FR" sz="1700">
-                          <a:effectLst/>
-                          <a:latin typeface="Liberation Sans" panose="020B0604020202020204" pitchFamily="34" charset="0"/>
-                        </a:rPr>
-                        <a:t>14/11/22</a:t>
                       </a:r>
                     </a:p>
                   </a:txBody>
@@ -4497,7 +4443,61 @@
                           <a:effectLst/>
                           <a:latin typeface="Liberation Sans" panose="020B0604020202020204" pitchFamily="34" charset="0"/>
                         </a:rPr>
-                        <a:t>API</a:t>
+                        <a:t>13/11</a:t>
+                      </a:r>
+                    </a:p>
+                  </a:txBody>
+                  <a:tcPr marL="87038" marR="87038" marT="43519" marB="43519" anchor="ctr">
+                    <a:lnL w="7620" cap="flat" cmpd="sng" algn="ctr">
+                      <a:solidFill>
+                        <a:srgbClr val="000000"/>
+                      </a:solidFill>
+                      <a:prstDash val="solid"/>
+                      <a:round/>
+                      <a:headEnd type="none" w="med" len="med"/>
+                      <a:tailEnd type="none" w="med" len="med"/>
+                    </a:lnL>
+                    <a:lnR w="7620" cap="flat" cmpd="sng" algn="ctr">
+                      <a:solidFill>
+                        <a:srgbClr val="000000"/>
+                      </a:solidFill>
+                      <a:prstDash val="solid"/>
+                      <a:round/>
+                      <a:headEnd type="none" w="med" len="med"/>
+                      <a:tailEnd type="none" w="med" len="med"/>
+                    </a:lnR>
+                    <a:lnT w="7620" cap="flat" cmpd="sng" algn="ctr">
+                      <a:solidFill>
+                        <a:srgbClr val="000000"/>
+                      </a:solidFill>
+                      <a:prstDash val="solid"/>
+                      <a:round/>
+                      <a:headEnd type="none" w="med" len="med"/>
+                      <a:tailEnd type="none" w="med" len="med"/>
+                    </a:lnT>
+                    <a:lnB w="7620" cap="flat" cmpd="sng" algn="ctr">
+                      <a:solidFill>
+                        <a:srgbClr val="000000"/>
+                      </a:solidFill>
+                      <a:prstDash val="solid"/>
+                      <a:round/>
+                      <a:headEnd type="none" w="med" len="med"/>
+                      <a:tailEnd type="none" w="med" len="med"/>
+                    </a:lnB>
+                  </a:tcPr>
+                </a:tc>
+                <a:tc>
+                  <a:txBody>
+                    <a:bodyPr/>
+                    <a:lstStyle/>
+                    <a:p>
+                      <a:pPr algn="l"/>
+                      <a:r>
+                        <a:rPr lang="fr-FR" sz="1700" dirty="0">
+                          <a:effectLst/>
+                          <a:latin typeface="Liberation Sans" panose="020B0604020202020204" pitchFamily="34" charset="0"/>
+                        </a:rPr>
+                        <a:t>API Cinéma</a:t>
                       </a:r>
                     </a:p>
                   </a:txBody>
@@ -4554,7 +4554,7 @@
                     <a:p>
                       <a:pPr algn="l"/>
                       <a:r>
-                        <a:rPr lang="fr-FR" sz="1700">
+                        <a:rPr lang="fr-FR" sz="1700" dirty="0">
                           <a:effectLst/>
                           <a:latin typeface="Liberation Sans" panose="020B0604020202020204" pitchFamily="34" charset="0"/>
                         </a:rPr>
@@ -4608,11 +4608,11 @@
                     <a:p>
                       <a:pPr algn="l"/>
                       <a:r>
-                        <a:rPr lang="fr-FR" sz="1700">
+                        <a:rPr lang="fr-FR" sz="1700" dirty="0">
                           <a:effectLst/>
                           <a:latin typeface="Liberation Sans" panose="020B0604020202020204" pitchFamily="34" charset="0"/>
                         </a:rPr>
-                        <a:t>21/11/22</a:t>
+                        <a:t>20/11</a:t>
                       </a:r>
                     </a:p>
                   </a:txBody>
@@ -4723,11 +4723,65 @@
                     <a:p>
                       <a:pPr algn="l"/>
                       <a:r>
-                        <a:rPr lang="fr-FR" sz="1700">
+                        <a:rPr lang="fr-FR" sz="1700" dirty="0">
                           <a:effectLst/>
                           <a:latin typeface="Liberation Sans" panose="020B0604020202020204" pitchFamily="34" charset="0"/>
                         </a:rPr>
                         <a:t>10</a:t>
+                      </a:r>
+                    </a:p>
+                  </a:txBody>
+                  <a:tcPr marL="87038" marR="87038" marT="43519" marB="43519" anchor="ctr">
+                    <a:lnL w="7620" cap="flat" cmpd="sng" algn="ctr">
+                      <a:solidFill>
+                        <a:srgbClr val="000000"/>
+                      </a:solidFill>
+                      <a:prstDash val="solid"/>
+                      <a:round/>
+                      <a:headEnd type="none" w="med" len="med"/>
+                      <a:tailEnd type="none" w="med" len="med"/>
+                    </a:lnL>
+                    <a:lnR w="7620" cap="flat" cmpd="sng" algn="ctr">
+                      <a:solidFill>
+                        <a:srgbClr val="000000"/>
+                      </a:solidFill>
+                      <a:prstDash val="solid"/>
+                      <a:round/>
+                      <a:headEnd type="none" w="med" len="med"/>
+                      <a:tailEnd type="none" w="med" len="med"/>
+                    </a:lnR>
+                    <a:lnT w="7620" cap="flat" cmpd="sng" algn="ctr">
+                      <a:solidFill>
+                        <a:srgbClr val="000000"/>
+                      </a:solidFill>
+                      <a:prstDash val="solid"/>
+                      <a:round/>
+                      <a:headEnd type="none" w="med" len="med"/>
+                      <a:tailEnd type="none" w="med" len="med"/>
+                    </a:lnT>
+                    <a:lnB w="7620" cap="flat" cmpd="sng" algn="ctr">
+                      <a:solidFill>
+                        <a:srgbClr val="000000"/>
+                      </a:solidFill>
+                      <a:prstDash val="solid"/>
+                      <a:round/>
+                      <a:headEnd type="none" w="med" len="med"/>
+                      <a:tailEnd type="none" w="med" len="med"/>
+                    </a:lnB>
+                  </a:tcPr>
+                </a:tc>
+                <a:tc>
+                  <a:txBody>
+                    <a:bodyPr/>
+                    <a:lstStyle/>
+                    <a:p>
+                      <a:pPr algn="l"/>
+                      <a:r>
+                        <a:rPr lang="fr-FR" sz="1700" dirty="0">
+                          <a:effectLst/>
+                          <a:latin typeface="Liberation Sans" panose="020B0604020202020204" pitchFamily="34" charset="0"/>
+                        </a:rPr>
+                        <a:t>27/11</a:t>
                       </a:r>
                     </a:p>
                   </a:txBody>
@@ -4781,62 +4835,12 @@
                           <a:effectLst/>
                           <a:latin typeface="Liberation Sans" panose="020B0604020202020204" pitchFamily="34" charset="0"/>
                         </a:rPr>
-                        <a:t>28/11/22</a:t>
+                        <a:t>API</a:t>
                       </a:r>
-                    </a:p>
-                  </a:txBody>
-                  <a:tcPr marL="87038" marR="87038" marT="43519" marB="43519" anchor="ctr">
-                    <a:lnL w="7620" cap="flat" cmpd="sng" algn="ctr">
-                      <a:solidFill>
-                        <a:srgbClr val="000000"/>
-                      </a:solidFill>
-                      <a:prstDash val="solid"/>
-                      <a:round/>
-                      <a:headEnd type="none" w="med" len="med"/>
-                      <a:tailEnd type="none" w="med" len="med"/>
-                    </a:lnL>
-                    <a:lnR w="7620" cap="flat" cmpd="sng" algn="ctr">
-                      <a:solidFill>
-                        <a:srgbClr val="000000"/>
-                      </a:solidFill>
-                      <a:prstDash val="solid"/>
-                      <a:round/>
-                      <a:headEnd type="none" w="med" len="med"/>
-                      <a:tailEnd type="none" w="med" len="med"/>
-                    </a:lnR>
-                    <a:lnT w="7620" cap="flat" cmpd="sng" algn="ctr">
-                      <a:solidFill>
-                        <a:srgbClr val="000000"/>
-                      </a:solidFill>
-                      <a:prstDash val="solid"/>
-                      <a:round/>
-                      <a:headEnd type="none" w="med" len="med"/>
-                      <a:tailEnd type="none" w="med" len="med"/>
-                    </a:lnT>
-                    <a:lnB w="7620" cap="flat" cmpd="sng" algn="ctr">
-                      <a:solidFill>
-                        <a:srgbClr val="000000"/>
-                      </a:solidFill>
-                      <a:prstDash val="solid"/>
-                      <a:round/>
-                      <a:headEnd type="none" w="med" len="med"/>
-                      <a:tailEnd type="none" w="med" len="med"/>
-                    </a:lnB>
-                  </a:tcPr>
-                </a:tc>
-                <a:tc>
-                  <a:txBody>
-                    <a:bodyPr/>
-                    <a:lstStyle/>
-                    <a:p>
-                      <a:pPr algn="l"/>
-                      <a:r>
-                        <a:rPr lang="fr-FR" sz="1700" dirty="0">
-                          <a:effectLst/>
-                          <a:latin typeface="Liberation Sans" panose="020B0604020202020204" pitchFamily="34" charset="0"/>
-                        </a:rPr>
-                        <a:t>API Twitter</a:t>
-                      </a:r>
+                      <a:endParaRPr lang="fr-FR" sz="1700" dirty="0">
+                        <a:effectLst/>
+                        <a:latin typeface="Liberation Sans" panose="020B0604020202020204" pitchFamily="34" charset="0"/>
+                      </a:endParaRPr>
                     </a:p>
                   </a:txBody>
                   <a:tcPr marL="87038" marR="87038" marT="43519" marB="43519" anchor="ctr">
@@ -4892,7 +4896,7 @@
                     <a:p>
                       <a:pPr algn="l"/>
                       <a:r>
-                        <a:rPr lang="fr-FR" sz="1700">
+                        <a:rPr lang="fr-FR" sz="1700" dirty="0">
                           <a:effectLst/>
                           <a:latin typeface="Liberation Sans" panose="020B0604020202020204" pitchFamily="34" charset="0"/>
                         </a:rPr>
@@ -4946,11 +4950,11 @@
                     <a:p>
                       <a:pPr algn="l"/>
                       <a:r>
-                        <a:rPr lang="fr-FR" sz="1700">
+                        <a:rPr lang="fr-FR" sz="1700" dirty="0">
                           <a:effectLst/>
                           <a:latin typeface="Liberation Sans" panose="020B0604020202020204" pitchFamily="34" charset="0"/>
                         </a:rPr>
-                        <a:t>05/12/22</a:t>
+                        <a:t>4/12</a:t>
                       </a:r>
                     </a:p>
                   </a:txBody>
@@ -5064,7 +5068,7 @@
                     <a:p>
                       <a:pPr algn="l"/>
                       <a:r>
-                        <a:rPr lang="fr-FR" sz="1700">
+                        <a:rPr lang="fr-FR" sz="1700" dirty="0">
                           <a:effectLst/>
                           <a:latin typeface="Liberation Sans" panose="020B0604020202020204" pitchFamily="34" charset="0"/>
                         </a:rPr>
@@ -5118,11 +5122,11 @@
                     <a:p>
                       <a:pPr algn="l"/>
                       <a:r>
-                        <a:rPr lang="fr-FR" sz="1700">
+                        <a:rPr lang="fr-FR" sz="1700" dirty="0">
                           <a:effectLst/>
                           <a:latin typeface="Liberation Sans" panose="020B0604020202020204" pitchFamily="34" charset="0"/>
                         </a:rPr>
-                        <a:t>12/12/22</a:t>
+                        <a:t>11/12</a:t>
                       </a:r>
                     </a:p>
                   </a:txBody>

</xml_diff>

<commit_message>
Mise à jour 2025
</commit_message>
<xml_diff>
--- a/coursIntro.pptx
+++ b/coursIntro.pptx
@@ -367,7 +367,7 @@
             </a:pPr>
             <a:fld id="{870BBE49-FCCB-4A90-A45C-67088542EE9F}" type="datetime1">
               <a:rPr lang="fr-FR" smtClean="0"/>
-              <a:t>04/09/2024</a:t>
+              <a:t>04/09/2025</a:t>
             </a:fld>
             <a:endParaRPr lang="fr-FR"/>
           </a:p>
@@ -602,7 +602,7 @@
             </a:pPr>
             <a:fld id="{B3571AEC-2BC4-4B6C-B79E-00D12817ECD9}" type="datetime1">
               <a:rPr lang="fr-FR" smtClean="0"/>
-              <a:t>04/09/2024</a:t>
+              <a:t>04/09/2025</a:t>
             </a:fld>
             <a:endParaRPr lang="fr-FR"/>
           </a:p>
@@ -1144,7 +1144,7 @@
             </a:pPr>
             <a:fld id="{046FFCB7-D57F-4C8C-BA32-2BA73F4500C6}" type="datetime1">
               <a:rPr lang="fr-FR" smtClean="0"/>
-              <a:t>04/09/2024</a:t>
+              <a:t>04/09/2025</a:t>
             </a:fld>
             <a:endParaRPr lang="fr-FR"/>
           </a:p>
@@ -1436,7 +1436,7 @@
             </a:pPr>
             <a:fld id="{CA852A4D-1BFF-498F-B63C-A36E50EC025B}" type="datetime1">
               <a:rPr lang="fr-FR" smtClean="0"/>
-              <a:t>04/09/2024</a:t>
+              <a:t>04/09/2025</a:t>
             </a:fld>
             <a:endParaRPr lang="fr-FR"/>
           </a:p>
@@ -2029,7 +2029,7 @@
             </a:br>
             <a:r>
               <a:rPr lang="fr-FR" altLang="fr-FR" dirty="0"/>
-              <a:t>Septembre 2024</a:t>
+              <a:t>Septembre 2025</a:t>
             </a:r>
             <a:br>
               <a:rPr lang="fr-FR" altLang="fr-FR" dirty="0"/>
@@ -2929,7 +2929,7 @@
           <p:nvPr>
             <p:extLst>
               <p:ext uri="{D42A27DB-BD31-4B8C-83A1-F6EECF244321}">
-                <p14:modId xmlns:p14="http://schemas.microsoft.com/office/powerpoint/2010/main" val="538973864"/>
+                <p14:modId xmlns:p14="http://schemas.microsoft.com/office/powerpoint/2010/main" val="2694647265"/>
               </p:ext>
             </p:extLst>
           </p:nvPr>
@@ -3209,7 +3209,7 @@
                           <a:effectLst/>
                           <a:latin typeface="Liberation Sans" panose="020B0604020202020204" pitchFamily="34" charset="0"/>
                         </a:rPr>
-                        <a:t>9/9</a:t>
+                        <a:t>8/9</a:t>
                       </a:r>
                     </a:p>
                   </a:txBody>
@@ -3394,7 +3394,7 @@
                           <a:effectLst/>
                           <a:latin typeface="Liberation Sans" panose="020B0604020202020204" pitchFamily="34" charset="0"/>
                         </a:rPr>
-                        <a:t>16/9</a:t>
+                        <a:t>15/9</a:t>
                       </a:r>
                     </a:p>
                   </a:txBody>
@@ -3579,7 +3579,7 @@
                           <a:effectLst/>
                           <a:latin typeface="Liberation Sans" panose="020B0604020202020204" pitchFamily="34" charset="0"/>
                         </a:rPr>
-                        <a:t>23/9</a:t>
+                        <a:t>22/9</a:t>
                       </a:r>
                     </a:p>
                   </a:txBody>
@@ -3748,7 +3748,7 @@
                           <a:effectLst/>
                           <a:latin typeface="Liberation Sans" panose="020B0604020202020204" pitchFamily="34" charset="0"/>
                         </a:rPr>
-                        <a:t>30/9</a:t>
+                        <a:t>29/9</a:t>
                       </a:r>
                     </a:p>
                   </a:txBody>
@@ -3917,7 +3917,7 @@
                           <a:effectLst/>
                           <a:latin typeface="Liberation Sans" panose="020B0604020202020204" pitchFamily="34" charset="0"/>
                         </a:rPr>
-                        <a:t>7/10</a:t>
+                        <a:t>6/10</a:t>
                       </a:r>
                     </a:p>
                   </a:txBody>
@@ -4086,7 +4086,7 @@
                           <a:effectLst/>
                           <a:latin typeface="Liberation Sans" panose="020B0604020202020204" pitchFamily="34" charset="0"/>
                         </a:rPr>
-                        <a:t>17/10</a:t>
+                        <a:t>13/10</a:t>
                       </a:r>
                     </a:p>
                   </a:txBody>
@@ -4271,7 +4271,7 @@
                           <a:effectLst/>
                           <a:latin typeface="Liberation Sans" panose="020B0604020202020204" pitchFamily="34" charset="0"/>
                         </a:rPr>
-                        <a:t>21/10</a:t>
+                        <a:t>20/10</a:t>
                       </a:r>
                     </a:p>
                   </a:txBody>
@@ -4459,7 +4459,7 @@
                           <a:effectLst/>
                           <a:latin typeface="Liberation Sans" panose="020B0604020202020204" pitchFamily="34" charset="0"/>
                         </a:rPr>
-                        <a:t>4/11</a:t>
+                        <a:t>3/11</a:t>
                       </a:r>
                     </a:p>
                   </a:txBody>
@@ -4644,7 +4644,7 @@
                           <a:effectLst/>
                           <a:latin typeface="Liberation Sans" panose="020B0604020202020204" pitchFamily="34" charset="0"/>
                         </a:rPr>
-                        <a:t>20/11</a:t>
+                        <a:t>10/11</a:t>
                       </a:r>
                     </a:p>
                   </a:txBody>
@@ -4813,7 +4813,7 @@
                           <a:effectLst/>
                           <a:latin typeface="Liberation Sans" panose="020B0604020202020204" pitchFamily="34" charset="0"/>
                         </a:rPr>
-                        <a:t>27/11</a:t>
+                        <a:t>17/11</a:t>
                       </a:r>
                     </a:p>
                   </a:txBody>
@@ -4982,7 +4982,7 @@
                           <a:effectLst/>
                           <a:latin typeface="Liberation Sans" panose="020B0604020202020204" pitchFamily="34" charset="0"/>
                         </a:rPr>
-                        <a:t>4/12</a:t>
+                        <a:t>24/11</a:t>
                       </a:r>
                     </a:p>
                   </a:txBody>
@@ -5150,12 +5150,16 @@
                     <a:p>
                       <a:pPr algn="l"/>
                       <a:r>
-                        <a:rPr lang="fr-FR" sz="1700" dirty="0">
+                        <a:rPr lang="fr-FR" sz="1700">
                           <a:effectLst/>
                           <a:latin typeface="Liberation Sans" panose="020B0604020202020204" pitchFamily="34" charset="0"/>
                         </a:rPr>
-                        <a:t>11/12</a:t>
+                        <a:t>1/12</a:t>
                       </a:r>
+                      <a:endParaRPr lang="fr-FR" sz="1700" dirty="0">
+                        <a:effectLst/>
+                        <a:latin typeface="Liberation Sans" panose="020B0604020202020204" pitchFamily="34" charset="0"/>
+                      </a:endParaRPr>
                     </a:p>
                   </a:txBody>
                   <a:tcPr marL="87038" marR="87038" marT="43519" marB="43519" anchor="ctr">

</xml_diff>